<commit_message>
agrego al ppt algunos comentarios
</commit_message>
<xml_diff>
--- a/Material/Workshop devs 201508.pptx
+++ b/Material/Workshop devs 201508.pptx
@@ -7,7 +7,8 @@
   <p:sldIdLst>
     <p:sldId id="256" r:id="rId2"/>
     <p:sldId id="257" r:id="rId3"/>
-    <p:sldId id="258" r:id="rId4"/>
+    <p:sldId id="259" r:id="rId4"/>
+    <p:sldId id="258" r:id="rId5"/>
   </p:sldIdLst>
   <p:sldSz cx="12192000" cy="6858000"/>
   <p:notesSz cx="6858000" cy="9144000"/>
@@ -3170,7 +3171,7 @@
               <a:t>deploy</a:t>
             </a:r>
             <a:r>
-              <a:rPr lang="es-AR" smtClean="0"/>
+              <a:rPr lang="es-AR" dirty="0" smtClean="0"/>
               <a:t> automático</a:t>
             </a:r>
             <a:endParaRPr lang="en-US" dirty="0"/>
@@ -3187,6 +3188,13 @@
   <p:clrMapOvr>
     <a:masterClrMapping/>
   </p:clrMapOvr>
+  <p:timing>
+    <p:tnLst>
+      <p:par>
+        <p:cTn id="1" dur="indefinite" restart="never" nodeType="tmRoot"/>
+      </p:par>
+    </p:tnLst>
+  </p:timing>
 </p:sld>
 </file>
 
@@ -3575,7 +3583,7 @@
               <a:t>: </a:t>
             </a:r>
             <a:r>
-              <a:rPr lang="es-AR" smtClean="0"/>
+              <a:rPr lang="es-AR" dirty="0" err="1" smtClean="0"/>
               <a:t>declareParamFile:xxx.xml</a:t>
             </a:r>
             <a:endParaRPr lang="es-AR" dirty="0" smtClean="0"/>
@@ -3583,8 +3591,24 @@
           <a:p>
             <a:pPr lvl="2"/>
             <a:r>
-              <a:rPr lang="en-US" smtClean="0"/>
-              <a:t>Cuando se deploya el package: setParamFile:xxx.xml</a:t>
+              <a:rPr lang="en-US" dirty="0" err="1" smtClean="0"/>
+              <a:t>Cuando</a:t>
+            </a:r>
+            <a:r>
+              <a:rPr lang="en-US" dirty="0" smtClean="0"/>
+              <a:t> se </a:t>
+            </a:r>
+            <a:r>
+              <a:rPr lang="en-US" dirty="0" err="1" smtClean="0"/>
+              <a:t>deploya</a:t>
+            </a:r>
+            <a:r>
+              <a:rPr lang="en-US" dirty="0" smtClean="0"/>
+              <a:t> el package: </a:t>
+            </a:r>
+            <a:r>
+              <a:rPr lang="en-US" dirty="0" err="1" smtClean="0"/>
+              <a:t>setParamFile:xxx.xml</a:t>
             </a:r>
             <a:endParaRPr lang="en-US" dirty="0"/>
           </a:p>
@@ -3600,6 +3624,13 @@
   <p:clrMapOvr>
     <a:masterClrMapping/>
   </p:clrMapOvr>
+  <p:timing>
+    <p:tnLst>
+      <p:par>
+        <p:cTn id="1" dur="indefinite" restart="never" nodeType="tmRoot"/>
+      </p:par>
+    </p:tnLst>
+  </p:timing>
 </p:sld>
 </file>
 
@@ -3654,6 +3685,204 @@
           <a:bodyPr/>
           <a:lstStyle/>
           <a:p>
+            <a:r>
+              <a:rPr lang="es-AR" dirty="0" smtClean="0"/>
+              <a:t>1) </a:t>
+            </a:r>
+            <a:r>
+              <a:rPr lang="es-AR" dirty="0" err="1" smtClean="0"/>
+              <a:t>build</a:t>
+            </a:r>
+            <a:r>
+              <a:rPr lang="es-AR" dirty="0" smtClean="0"/>
+              <a:t> server: </a:t>
+            </a:r>
+            <a:r>
+              <a:rPr lang="es-AR" dirty="0" err="1" smtClean="0"/>
+              <a:t>vsonline</a:t>
+            </a:r>
+            <a:r>
+              <a:rPr lang="es-AR" dirty="0"/>
+              <a:t> </a:t>
+            </a:r>
+            <a:r>
+              <a:rPr lang="es-AR" dirty="0" smtClean="0"/>
+              <a:t>-&gt; </a:t>
+            </a:r>
+            <a:r>
+              <a:rPr lang="es-AR" dirty="0" err="1" smtClean="0"/>
+              <a:t>deploy</a:t>
+            </a:r>
+            <a:r>
+              <a:rPr lang="es-AR" dirty="0" smtClean="0"/>
+              <a:t> a </a:t>
+            </a:r>
+            <a:r>
+              <a:rPr lang="es-AR" dirty="0" err="1" smtClean="0"/>
+              <a:t>azure</a:t>
+            </a:r>
+            <a:endParaRPr lang="es-AR" dirty="0" smtClean="0"/>
+          </a:p>
+          <a:p>
+            <a:r>
+              <a:rPr lang="es-AR" dirty="0" smtClean="0"/>
+              <a:t>2) </a:t>
+            </a:r>
+            <a:r>
+              <a:rPr lang="es-AR" dirty="0" err="1" smtClean="0"/>
+              <a:t>download</a:t>
+            </a:r>
+            <a:r>
+              <a:rPr lang="es-AR" dirty="0" smtClean="0"/>
+              <a:t> </a:t>
+            </a:r>
+            <a:r>
+              <a:rPr lang="es-AR" dirty="0" err="1" smtClean="0"/>
+              <a:t>capsa</a:t>
+            </a:r>
+            <a:r>
+              <a:rPr lang="es-AR" dirty="0" smtClean="0"/>
+              <a:t>: </a:t>
+            </a:r>
+            <a:r>
+              <a:rPr lang="es-AR" dirty="0" err="1" smtClean="0"/>
+              <a:t>msdeploy</a:t>
+            </a:r>
+            <a:r>
+              <a:rPr lang="es-AR" dirty="0" smtClean="0"/>
+              <a:t> bajo el sitio de </a:t>
+            </a:r>
+            <a:r>
+              <a:rPr lang="es-AR" dirty="0" err="1" smtClean="0"/>
+              <a:t>azure</a:t>
+            </a:r>
+            <a:r>
+              <a:rPr lang="es-AR" dirty="0" smtClean="0"/>
+              <a:t> y creo un </a:t>
+            </a:r>
+            <a:r>
+              <a:rPr lang="es-AR" dirty="0" err="1" smtClean="0"/>
+              <a:t>package</a:t>
+            </a:r>
+            <a:r>
+              <a:rPr lang="es-AR" dirty="0" smtClean="0"/>
+              <a:t> .</a:t>
+            </a:r>
+            <a:r>
+              <a:rPr lang="es-AR" dirty="0" err="1" smtClean="0"/>
+              <a:t>zip</a:t>
+            </a:r>
+            <a:endParaRPr lang="es-AR" dirty="0" smtClean="0"/>
+          </a:p>
+          <a:p>
+            <a:r>
+              <a:rPr lang="es-AR" dirty="0" smtClean="0"/>
+              <a:t>3) </a:t>
+            </a:r>
+            <a:r>
+              <a:rPr lang="es-AR" dirty="0" err="1" smtClean="0"/>
+              <a:t>deploy</a:t>
+            </a:r>
+            <a:r>
+              <a:rPr lang="es-AR" dirty="0" smtClean="0"/>
+              <a:t>: tomo el </a:t>
+            </a:r>
+            <a:r>
+              <a:rPr lang="es-AR" dirty="0" err="1" smtClean="0"/>
+              <a:t>package</a:t>
+            </a:r>
+            <a:r>
+              <a:rPr lang="es-AR" dirty="0" smtClean="0"/>
+              <a:t> y lo </a:t>
+            </a:r>
+            <a:r>
+              <a:rPr lang="es-AR" dirty="0" err="1" smtClean="0"/>
+              <a:t>deployo</a:t>
+            </a:r>
+            <a:r>
+              <a:rPr lang="es-AR" dirty="0" smtClean="0"/>
+              <a:t> con parámetros en </a:t>
+            </a:r>
+            <a:r>
+              <a:rPr lang="es-AR" dirty="0" err="1" smtClean="0"/>
+              <a:t>iis</a:t>
+            </a:r>
+            <a:r>
+              <a:rPr lang="es-AR" dirty="0" smtClean="0"/>
+              <a:t> de </a:t>
+            </a:r>
+            <a:r>
+              <a:rPr lang="es-AR" dirty="0" err="1" smtClean="0"/>
+              <a:t>capsa</a:t>
+            </a:r>
+            <a:endParaRPr lang="en-US" dirty="0"/>
+          </a:p>
+        </p:txBody>
+      </p:sp>
+    </p:spTree>
+    <p:extLst>
+      <p:ext uri="{BB962C8B-B14F-4D97-AF65-F5344CB8AC3E}">
+        <p14:creationId xmlns:p14="http://schemas.microsoft.com/office/powerpoint/2010/main" val="533230194"/>
+      </p:ext>
+    </p:extLst>
+  </p:cSld>
+  <p:clrMapOvr>
+    <a:masterClrMapping/>
+  </p:clrMapOvr>
+</p:sld>
+</file>
+
+<file path=ppt/slides/slide4.xml><?xml version="1.0" encoding="utf-8"?>
+<p:sld xmlns:a="http://schemas.openxmlformats.org/drawingml/2006/main" xmlns:r="http://schemas.openxmlformats.org/officeDocument/2006/relationships" xmlns:p="http://schemas.openxmlformats.org/presentationml/2006/main">
+  <p:cSld>
+    <p:spTree>
+      <p:nvGrpSpPr>
+        <p:cNvPr id="1" name=""/>
+        <p:cNvGrpSpPr/>
+        <p:nvPr/>
+      </p:nvGrpSpPr>
+      <p:grpSpPr>
+        <a:xfrm>
+          <a:off x="0" y="0"/>
+          <a:ext cx="0" cy="0"/>
+          <a:chOff x="0" y="0"/>
+          <a:chExt cx="0" cy="0"/>
+        </a:xfrm>
+      </p:grpSpPr>
+      <p:sp>
+        <p:nvSpPr>
+          <p:cNvPr id="2" name="Título 1"/>
+          <p:cNvSpPr>
+            <a:spLocks noGrp="1"/>
+          </p:cNvSpPr>
+          <p:nvPr>
+            <p:ph type="title"/>
+          </p:nvPr>
+        </p:nvSpPr>
+        <p:spPr/>
+        <p:txBody>
+          <a:bodyPr/>
+          <a:lstStyle/>
+          <a:p>
+            <a:endParaRPr lang="en-US"/>
+          </a:p>
+        </p:txBody>
+      </p:sp>
+      <p:sp>
+        <p:nvSpPr>
+          <p:cNvPr id="3" name="Marcador de contenido 2"/>
+          <p:cNvSpPr>
+            <a:spLocks noGrp="1"/>
+          </p:cNvSpPr>
+          <p:nvPr>
+            <p:ph idx="1"/>
+          </p:nvPr>
+        </p:nvSpPr>
+        <p:spPr/>
+        <p:txBody>
+          <a:bodyPr/>
+          <a:lstStyle/>
+          <a:p>
             <a:endParaRPr lang="en-US"/>
           </a:p>
         </p:txBody>
@@ -3668,6 +3897,13 @@
   <p:clrMapOvr>
     <a:masterClrMapping/>
   </p:clrMapOvr>
+  <p:timing>
+    <p:tnLst>
+      <p:par>
+        <p:cTn id="1" dur="indefinite" restart="never" nodeType="tmRoot"/>
+      </p:par>
+    </p:tnLst>
+  </p:timing>
 </p:sld>
 </file>
 

</xml_diff>